<commit_message>
Site updated: 2023-08-13 15:07:03
</commit_message>
<xml_diff>
--- a/PPT/数据结构.pptx
+++ b/PPT/数据结构.pptx
@@ -112,6 +112,11 @@
       </a:defRPr>
     </a:lvl9pPr>
   </p:defaultTextStyle>
+  <p:extLst>
+    <p:ext uri="{EFAFB233-063F-42B5-8137-9DF3F51BA10A}">
+      <p15:sldGuideLst xmlns:p15="http://schemas.microsoft.com/office/powerpoint/2012/main"/>
+    </p:ext>
+  </p:extLst>
 </p:presentation>
 </file>
 
@@ -262,7 +267,7 @@
           <a:p>
             <a:fld id="{71E1AAB3-5AD5-4D40-B5A6-73E11038D7A5}" type="datetimeFigureOut">
               <a:rPr lang="zh-CN" altLang="en-US" smtClean="0"/>
-              <a:t>2023/8/11</a:t>
+              <a:t>2023/8/12</a:t>
             </a:fld>
             <a:endParaRPr lang="zh-CN" altLang="en-US"/>
           </a:p>
@@ -460,7 +465,7 @@
           <a:p>
             <a:fld id="{71E1AAB3-5AD5-4D40-B5A6-73E11038D7A5}" type="datetimeFigureOut">
               <a:rPr lang="zh-CN" altLang="en-US" smtClean="0"/>
-              <a:t>2023/8/11</a:t>
+              <a:t>2023/8/12</a:t>
             </a:fld>
             <a:endParaRPr lang="zh-CN" altLang="en-US"/>
           </a:p>
@@ -668,7 +673,7 @@
           <a:p>
             <a:fld id="{71E1AAB3-5AD5-4D40-B5A6-73E11038D7A5}" type="datetimeFigureOut">
               <a:rPr lang="zh-CN" altLang="en-US" smtClean="0"/>
-              <a:t>2023/8/11</a:t>
+              <a:t>2023/8/12</a:t>
             </a:fld>
             <a:endParaRPr lang="zh-CN" altLang="en-US"/>
           </a:p>
@@ -866,7 +871,7 @@
           <a:p>
             <a:fld id="{71E1AAB3-5AD5-4D40-B5A6-73E11038D7A5}" type="datetimeFigureOut">
               <a:rPr lang="zh-CN" altLang="en-US" smtClean="0"/>
-              <a:t>2023/8/11</a:t>
+              <a:t>2023/8/12</a:t>
             </a:fld>
             <a:endParaRPr lang="zh-CN" altLang="en-US"/>
           </a:p>
@@ -1141,7 +1146,7 @@
           <a:p>
             <a:fld id="{71E1AAB3-5AD5-4D40-B5A6-73E11038D7A5}" type="datetimeFigureOut">
               <a:rPr lang="zh-CN" altLang="en-US" smtClean="0"/>
-              <a:t>2023/8/11</a:t>
+              <a:t>2023/8/12</a:t>
             </a:fld>
             <a:endParaRPr lang="zh-CN" altLang="en-US"/>
           </a:p>
@@ -1406,7 +1411,7 @@
           <a:p>
             <a:fld id="{71E1AAB3-5AD5-4D40-B5A6-73E11038D7A5}" type="datetimeFigureOut">
               <a:rPr lang="zh-CN" altLang="en-US" smtClean="0"/>
-              <a:t>2023/8/11</a:t>
+              <a:t>2023/8/12</a:t>
             </a:fld>
             <a:endParaRPr lang="zh-CN" altLang="en-US"/>
           </a:p>
@@ -1818,7 +1823,7 @@
           <a:p>
             <a:fld id="{71E1AAB3-5AD5-4D40-B5A6-73E11038D7A5}" type="datetimeFigureOut">
               <a:rPr lang="zh-CN" altLang="en-US" smtClean="0"/>
-              <a:t>2023/8/11</a:t>
+              <a:t>2023/8/12</a:t>
             </a:fld>
             <a:endParaRPr lang="zh-CN" altLang="en-US"/>
           </a:p>
@@ -1959,7 +1964,7 @@
           <a:p>
             <a:fld id="{71E1AAB3-5AD5-4D40-B5A6-73E11038D7A5}" type="datetimeFigureOut">
               <a:rPr lang="zh-CN" altLang="en-US" smtClean="0"/>
-              <a:t>2023/8/11</a:t>
+              <a:t>2023/8/12</a:t>
             </a:fld>
             <a:endParaRPr lang="zh-CN" altLang="en-US"/>
           </a:p>
@@ -2072,7 +2077,7 @@
           <a:p>
             <a:fld id="{71E1AAB3-5AD5-4D40-B5A6-73E11038D7A5}" type="datetimeFigureOut">
               <a:rPr lang="zh-CN" altLang="en-US" smtClean="0"/>
-              <a:t>2023/8/11</a:t>
+              <a:t>2023/8/12</a:t>
             </a:fld>
             <a:endParaRPr lang="zh-CN" altLang="en-US"/>
           </a:p>
@@ -2383,7 +2388,7 @@
           <a:p>
             <a:fld id="{71E1AAB3-5AD5-4D40-B5A6-73E11038D7A5}" type="datetimeFigureOut">
               <a:rPr lang="zh-CN" altLang="en-US" smtClean="0"/>
-              <a:t>2023/8/11</a:t>
+              <a:t>2023/8/12</a:t>
             </a:fld>
             <a:endParaRPr lang="zh-CN" altLang="en-US"/>
           </a:p>
@@ -2671,7 +2676,7 @@
           <a:p>
             <a:fld id="{71E1AAB3-5AD5-4D40-B5A6-73E11038D7A5}" type="datetimeFigureOut">
               <a:rPr lang="zh-CN" altLang="en-US" smtClean="0"/>
-              <a:t>2023/8/11</a:t>
+              <a:t>2023/8/12</a:t>
             </a:fld>
             <a:endParaRPr lang="zh-CN" altLang="en-US"/>
           </a:p>
@@ -2912,7 +2917,7 @@
           <a:p>
             <a:fld id="{71E1AAB3-5AD5-4D40-B5A6-73E11038D7A5}" type="datetimeFigureOut">
               <a:rPr lang="zh-CN" altLang="en-US" smtClean="0"/>
-              <a:t>2023/8/11</a:t>
+              <a:t>2023/8/12</a:t>
             </a:fld>
             <a:endParaRPr lang="zh-CN" altLang="en-US"/>
           </a:p>
@@ -3350,11 +3355,13 @@
             <a:avLst/>
           </a:prstGeom>
           <a:solidFill>
-            <a:schemeClr val="bg2">
-              <a:lumMod val="90000"/>
-            </a:schemeClr>
-          </a:solidFill>
-          <a:ln w="76200"/>
+            <a:schemeClr val="accent1"/>
+          </a:solidFill>
+          <a:ln w="76200">
+            <a:solidFill>
+              <a:schemeClr val="tx1"/>
+            </a:solidFill>
+          </a:ln>
         </p:spPr>
         <p:style>
           <a:lnRef idx="2">
@@ -3845,13 +3852,13 @@
   <p:clrMapOvr>
     <a:masterClrMapping/>
   </p:clrMapOvr>
-  <mc:AlternateContent xmlns:mc="http://schemas.openxmlformats.org/markup-compatibility/2006">
-    <mc:Choice xmlns:p159="http://schemas.microsoft.com/office/powerpoint/2015/09/main" Requires="p159">
+  <mc:AlternateContent xmlns:mc="http://schemas.openxmlformats.org/markup-compatibility/2006" xmlns:p159="http://schemas.microsoft.com/office/powerpoint/2015/09/main">
+    <mc:Choice Requires="p159">
       <p:transition xmlns:p14="http://schemas.microsoft.com/office/powerpoint/2010/main" spd="slow" p14:dur="2000">
         <p159:morph option="byObject"/>
       </p:transition>
     </mc:Choice>
-    <mc:Fallback>
+    <mc:Fallback xmlns="">
       <p:transition spd="slow">
         <p:fade/>
       </p:transition>
@@ -4393,13 +4400,13 @@
   <p:clrMapOvr>
     <a:masterClrMapping/>
   </p:clrMapOvr>
-  <mc:AlternateContent xmlns:mc="http://schemas.openxmlformats.org/markup-compatibility/2006">
-    <mc:Choice xmlns:p159="http://schemas.microsoft.com/office/powerpoint/2015/09/main" Requires="p159">
+  <mc:AlternateContent xmlns:mc="http://schemas.openxmlformats.org/markup-compatibility/2006" xmlns:p159="http://schemas.microsoft.com/office/powerpoint/2015/09/main">
+    <mc:Choice Requires="p159">
       <p:transition xmlns:p14="http://schemas.microsoft.com/office/powerpoint/2010/main" spd="slow" p14:dur="2000">
         <p159:morph option="byObject"/>
       </p:transition>
     </mc:Choice>
-    <mc:Fallback>
+    <mc:Fallback xmlns="">
       <p:transition spd="slow">
         <p:fade/>
       </p:transition>
@@ -4941,13 +4948,13 @@
   <p:clrMapOvr>
     <a:masterClrMapping/>
   </p:clrMapOvr>
-  <mc:AlternateContent xmlns:mc="http://schemas.openxmlformats.org/markup-compatibility/2006">
-    <mc:Choice xmlns:p159="http://schemas.microsoft.com/office/powerpoint/2015/09/main" Requires="p159">
+  <mc:AlternateContent xmlns:mc="http://schemas.openxmlformats.org/markup-compatibility/2006" xmlns:p159="http://schemas.microsoft.com/office/powerpoint/2015/09/main">
+    <mc:Choice Requires="p159">
       <p:transition xmlns:p14="http://schemas.microsoft.com/office/powerpoint/2010/main" spd="slow" p14:dur="2000">
         <p159:morph option="byObject"/>
       </p:transition>
     </mc:Choice>
-    <mc:Fallback>
+    <mc:Fallback xmlns="">
       <p:transition spd="slow">
         <p:fade/>
       </p:transition>
@@ -5489,13 +5496,13 @@
   <p:clrMapOvr>
     <a:masterClrMapping/>
   </p:clrMapOvr>
-  <mc:AlternateContent xmlns:mc="http://schemas.openxmlformats.org/markup-compatibility/2006">
-    <mc:Choice xmlns:p159="http://schemas.microsoft.com/office/powerpoint/2015/09/main" Requires="p159">
+  <mc:AlternateContent xmlns:mc="http://schemas.openxmlformats.org/markup-compatibility/2006" xmlns:p159="http://schemas.microsoft.com/office/powerpoint/2015/09/main">
+    <mc:Choice Requires="p159">
       <p:transition xmlns:p14="http://schemas.microsoft.com/office/powerpoint/2010/main" spd="slow" p14:dur="2000">
         <p159:morph option="byObject"/>
       </p:transition>
     </mc:Choice>
-    <mc:Fallback>
+    <mc:Fallback xmlns="">
       <p:transition spd="slow">
         <p:fade/>
       </p:transition>
@@ -6037,13 +6044,13 @@
   <p:clrMapOvr>
     <a:masterClrMapping/>
   </p:clrMapOvr>
-  <mc:AlternateContent xmlns:mc="http://schemas.openxmlformats.org/markup-compatibility/2006">
-    <mc:Choice xmlns:p159="http://schemas.microsoft.com/office/powerpoint/2015/09/main" Requires="p159">
+  <mc:AlternateContent xmlns:mc="http://schemas.openxmlformats.org/markup-compatibility/2006" xmlns:p159="http://schemas.microsoft.com/office/powerpoint/2015/09/main">
+    <mc:Choice Requires="p159">
       <p:transition xmlns:p14="http://schemas.microsoft.com/office/powerpoint/2010/main" spd="slow" p14:dur="2000">
         <p159:morph option="byObject"/>
       </p:transition>
     </mc:Choice>
-    <mc:Fallback>
+    <mc:Fallback xmlns="">
       <p:transition spd="slow">
         <p:fade/>
       </p:transition>
@@ -6585,13 +6592,13 @@
   <p:clrMapOvr>
     <a:masterClrMapping/>
   </p:clrMapOvr>
-  <mc:AlternateContent xmlns:mc="http://schemas.openxmlformats.org/markup-compatibility/2006">
-    <mc:Choice xmlns:p159="http://schemas.microsoft.com/office/powerpoint/2015/09/main" Requires="p159">
+  <mc:AlternateContent xmlns:mc="http://schemas.openxmlformats.org/markup-compatibility/2006" xmlns:p159="http://schemas.microsoft.com/office/powerpoint/2015/09/main">
+    <mc:Choice Requires="p159">
       <p:transition xmlns:p14="http://schemas.microsoft.com/office/powerpoint/2010/main" spd="slow" p14:dur="2000">
         <p159:morph option="byObject"/>
       </p:transition>
     </mc:Choice>
-    <mc:Fallback>
+    <mc:Fallback xmlns="">
       <p:transition spd="slow">
         <p:fade/>
       </p:transition>
@@ -7133,13 +7140,13 @@
   <p:clrMapOvr>
     <a:masterClrMapping/>
   </p:clrMapOvr>
-  <mc:AlternateContent xmlns:mc="http://schemas.openxmlformats.org/markup-compatibility/2006">
-    <mc:Choice xmlns:p159="http://schemas.microsoft.com/office/powerpoint/2015/09/main" Requires="p159">
+  <mc:AlternateContent xmlns:mc="http://schemas.openxmlformats.org/markup-compatibility/2006" xmlns:p159="http://schemas.microsoft.com/office/powerpoint/2015/09/main">
+    <mc:Choice Requires="p159">
       <p:transition xmlns:p14="http://schemas.microsoft.com/office/powerpoint/2010/main" spd="slow" p14:dur="2000">
         <p159:morph option="byObject"/>
       </p:transition>
     </mc:Choice>
-    <mc:Fallback>
+    <mc:Fallback xmlns="">
       <p:transition spd="slow">
         <p:fade/>
       </p:transition>
@@ -7681,13 +7688,13 @@
   <p:clrMapOvr>
     <a:masterClrMapping/>
   </p:clrMapOvr>
-  <mc:AlternateContent xmlns:mc="http://schemas.openxmlformats.org/markup-compatibility/2006">
-    <mc:Choice xmlns:p159="http://schemas.microsoft.com/office/powerpoint/2015/09/main" Requires="p159">
+  <mc:AlternateContent xmlns:mc="http://schemas.openxmlformats.org/markup-compatibility/2006" xmlns:p159="http://schemas.microsoft.com/office/powerpoint/2015/09/main">
+    <mc:Choice Requires="p159">
       <p:transition xmlns:p14="http://schemas.microsoft.com/office/powerpoint/2010/main" spd="slow" p14:dur="2000">
         <p159:morph option="byObject"/>
       </p:transition>
     </mc:Choice>
-    <mc:Fallback>
+    <mc:Fallback xmlns="">
       <p:transition spd="slow">
         <p:fade/>
       </p:transition>
@@ -8229,13 +8236,13 @@
   <p:clrMapOvr>
     <a:masterClrMapping/>
   </p:clrMapOvr>
-  <mc:AlternateContent xmlns:mc="http://schemas.openxmlformats.org/markup-compatibility/2006">
-    <mc:Choice xmlns:p159="http://schemas.microsoft.com/office/powerpoint/2015/09/main" Requires="p159">
+  <mc:AlternateContent xmlns:mc="http://schemas.openxmlformats.org/markup-compatibility/2006" xmlns:p159="http://schemas.microsoft.com/office/powerpoint/2015/09/main">
+    <mc:Choice Requires="p159">
       <p:transition xmlns:p14="http://schemas.microsoft.com/office/powerpoint/2010/main" spd="slow" p14:dur="2000">
         <p159:morph option="byObject"/>
       </p:transition>
     </mc:Choice>
-    <mc:Fallback>
+    <mc:Fallback xmlns="">
       <p:transition spd="slow">
         <p:fade/>
       </p:transition>

</xml_diff>

<commit_message>
Site updated: 2024-01-07 21:31:35
</commit_message>
<xml_diff>
--- a/PPT/数据结构.pptx
+++ b/PPT/数据结构.pptx
@@ -267,7 +267,7 @@
           <a:p>
             <a:fld id="{71E1AAB3-5AD5-4D40-B5A6-73E11038D7A5}" type="datetimeFigureOut">
               <a:rPr lang="zh-CN" altLang="en-US" smtClean="0"/>
-              <a:t>2023/8/12</a:t>
+              <a:t>2023/8/14</a:t>
             </a:fld>
             <a:endParaRPr lang="zh-CN" altLang="en-US"/>
           </a:p>
@@ -465,7 +465,7 @@
           <a:p>
             <a:fld id="{71E1AAB3-5AD5-4D40-B5A6-73E11038D7A5}" type="datetimeFigureOut">
               <a:rPr lang="zh-CN" altLang="en-US" smtClean="0"/>
-              <a:t>2023/8/12</a:t>
+              <a:t>2023/8/14</a:t>
             </a:fld>
             <a:endParaRPr lang="zh-CN" altLang="en-US"/>
           </a:p>
@@ -673,7 +673,7 @@
           <a:p>
             <a:fld id="{71E1AAB3-5AD5-4D40-B5A6-73E11038D7A5}" type="datetimeFigureOut">
               <a:rPr lang="zh-CN" altLang="en-US" smtClean="0"/>
-              <a:t>2023/8/12</a:t>
+              <a:t>2023/8/14</a:t>
             </a:fld>
             <a:endParaRPr lang="zh-CN" altLang="en-US"/>
           </a:p>
@@ -871,7 +871,7 @@
           <a:p>
             <a:fld id="{71E1AAB3-5AD5-4D40-B5A6-73E11038D7A5}" type="datetimeFigureOut">
               <a:rPr lang="zh-CN" altLang="en-US" smtClean="0"/>
-              <a:t>2023/8/12</a:t>
+              <a:t>2023/8/14</a:t>
             </a:fld>
             <a:endParaRPr lang="zh-CN" altLang="en-US"/>
           </a:p>
@@ -1146,7 +1146,7 @@
           <a:p>
             <a:fld id="{71E1AAB3-5AD5-4D40-B5A6-73E11038D7A5}" type="datetimeFigureOut">
               <a:rPr lang="zh-CN" altLang="en-US" smtClean="0"/>
-              <a:t>2023/8/12</a:t>
+              <a:t>2023/8/14</a:t>
             </a:fld>
             <a:endParaRPr lang="zh-CN" altLang="en-US"/>
           </a:p>
@@ -1411,7 +1411,7 @@
           <a:p>
             <a:fld id="{71E1AAB3-5AD5-4D40-B5A6-73E11038D7A5}" type="datetimeFigureOut">
               <a:rPr lang="zh-CN" altLang="en-US" smtClean="0"/>
-              <a:t>2023/8/12</a:t>
+              <a:t>2023/8/14</a:t>
             </a:fld>
             <a:endParaRPr lang="zh-CN" altLang="en-US"/>
           </a:p>
@@ -1823,7 +1823,7 @@
           <a:p>
             <a:fld id="{71E1AAB3-5AD5-4D40-B5A6-73E11038D7A5}" type="datetimeFigureOut">
               <a:rPr lang="zh-CN" altLang="en-US" smtClean="0"/>
-              <a:t>2023/8/12</a:t>
+              <a:t>2023/8/14</a:t>
             </a:fld>
             <a:endParaRPr lang="zh-CN" altLang="en-US"/>
           </a:p>
@@ -1964,7 +1964,7 @@
           <a:p>
             <a:fld id="{71E1AAB3-5AD5-4D40-B5A6-73E11038D7A5}" type="datetimeFigureOut">
               <a:rPr lang="zh-CN" altLang="en-US" smtClean="0"/>
-              <a:t>2023/8/12</a:t>
+              <a:t>2023/8/14</a:t>
             </a:fld>
             <a:endParaRPr lang="zh-CN" altLang="en-US"/>
           </a:p>
@@ -2077,7 +2077,7 @@
           <a:p>
             <a:fld id="{71E1AAB3-5AD5-4D40-B5A6-73E11038D7A5}" type="datetimeFigureOut">
               <a:rPr lang="zh-CN" altLang="en-US" smtClean="0"/>
-              <a:t>2023/8/12</a:t>
+              <a:t>2023/8/14</a:t>
             </a:fld>
             <a:endParaRPr lang="zh-CN" altLang="en-US"/>
           </a:p>
@@ -2388,7 +2388,7 @@
           <a:p>
             <a:fld id="{71E1AAB3-5AD5-4D40-B5A6-73E11038D7A5}" type="datetimeFigureOut">
               <a:rPr lang="zh-CN" altLang="en-US" smtClean="0"/>
-              <a:t>2023/8/12</a:t>
+              <a:t>2023/8/14</a:t>
             </a:fld>
             <a:endParaRPr lang="zh-CN" altLang="en-US"/>
           </a:p>
@@ -2676,7 +2676,7 @@
           <a:p>
             <a:fld id="{71E1AAB3-5AD5-4D40-B5A6-73E11038D7A5}" type="datetimeFigureOut">
               <a:rPr lang="zh-CN" altLang="en-US" smtClean="0"/>
-              <a:t>2023/8/12</a:t>
+              <a:t>2023/8/14</a:t>
             </a:fld>
             <a:endParaRPr lang="zh-CN" altLang="en-US"/>
           </a:p>
@@ -2917,7 +2917,7 @@
           <a:p>
             <a:fld id="{71E1AAB3-5AD5-4D40-B5A6-73E11038D7A5}" type="datetimeFigureOut">
               <a:rPr lang="zh-CN" altLang="en-US" smtClean="0"/>
-              <a:t>2023/8/12</a:t>
+              <a:t>2023/8/14</a:t>
             </a:fld>
             <a:endParaRPr lang="zh-CN" altLang="en-US"/>
           </a:p>

</xml_diff>